<commit_message>
Add R programming examples
</commit_message>
<xml_diff>
--- a/docs/slides/CollaborationToolsCodeManagement.pptx
+++ b/docs/slides/CollaborationToolsCodeManagement.pptx
@@ -297,7 +297,7 @@
           <a:p>
             <a:fld id="{A6220E79-6669-5F44-9D37-CE344312A2EE}" type="datetimeFigureOut">
               <a:rPr lang="en-US" smtClean="0"/>
-              <a:t>7/24/23</a:t>
+              <a:t>7/5/24</a:t>
             </a:fld>
             <a:endParaRPr lang="en-US"/>
           </a:p>
@@ -495,7 +495,7 @@
           <a:p>
             <a:fld id="{A6220E79-6669-5F44-9D37-CE344312A2EE}" type="datetimeFigureOut">
               <a:rPr lang="en-US" smtClean="0"/>
-              <a:t>7/24/23</a:t>
+              <a:t>7/5/24</a:t>
             </a:fld>
             <a:endParaRPr lang="en-US"/>
           </a:p>
@@ -703,7 +703,7 @@
           <a:p>
             <a:fld id="{A6220E79-6669-5F44-9D37-CE344312A2EE}" type="datetimeFigureOut">
               <a:rPr lang="en-US" smtClean="0"/>
-              <a:t>7/24/23</a:t>
+              <a:t>7/5/24</a:t>
             </a:fld>
             <a:endParaRPr lang="en-US"/>
           </a:p>
@@ -901,7 +901,7 @@
           <a:p>
             <a:fld id="{A6220E79-6669-5F44-9D37-CE344312A2EE}" type="datetimeFigureOut">
               <a:rPr lang="en-US" smtClean="0"/>
-              <a:t>7/24/23</a:t>
+              <a:t>7/5/24</a:t>
             </a:fld>
             <a:endParaRPr lang="en-US"/>
           </a:p>
@@ -1176,7 +1176,7 @@
           <a:p>
             <a:fld id="{A6220E79-6669-5F44-9D37-CE344312A2EE}" type="datetimeFigureOut">
               <a:rPr lang="en-US" smtClean="0"/>
-              <a:t>7/24/23</a:t>
+              <a:t>7/5/24</a:t>
             </a:fld>
             <a:endParaRPr lang="en-US"/>
           </a:p>
@@ -1441,7 +1441,7 @@
           <a:p>
             <a:fld id="{A6220E79-6669-5F44-9D37-CE344312A2EE}" type="datetimeFigureOut">
               <a:rPr lang="en-US" smtClean="0"/>
-              <a:t>7/24/23</a:t>
+              <a:t>7/5/24</a:t>
             </a:fld>
             <a:endParaRPr lang="en-US"/>
           </a:p>
@@ -1853,7 +1853,7 @@
           <a:p>
             <a:fld id="{A6220E79-6669-5F44-9D37-CE344312A2EE}" type="datetimeFigureOut">
               <a:rPr lang="en-US" smtClean="0"/>
-              <a:t>7/24/23</a:t>
+              <a:t>7/5/24</a:t>
             </a:fld>
             <a:endParaRPr lang="en-US"/>
           </a:p>
@@ -1994,7 +1994,7 @@
           <a:p>
             <a:fld id="{A6220E79-6669-5F44-9D37-CE344312A2EE}" type="datetimeFigureOut">
               <a:rPr lang="en-US" smtClean="0"/>
-              <a:t>7/24/23</a:t>
+              <a:t>7/5/24</a:t>
             </a:fld>
             <a:endParaRPr lang="en-US"/>
           </a:p>
@@ -2107,7 +2107,7 @@
           <a:p>
             <a:fld id="{A6220E79-6669-5F44-9D37-CE344312A2EE}" type="datetimeFigureOut">
               <a:rPr lang="en-US" smtClean="0"/>
-              <a:t>7/24/23</a:t>
+              <a:t>7/5/24</a:t>
             </a:fld>
             <a:endParaRPr lang="en-US"/>
           </a:p>
@@ -2418,7 +2418,7 @@
           <a:p>
             <a:fld id="{A6220E79-6669-5F44-9D37-CE344312A2EE}" type="datetimeFigureOut">
               <a:rPr lang="en-US" smtClean="0"/>
-              <a:t>7/24/23</a:t>
+              <a:t>7/5/24</a:t>
             </a:fld>
             <a:endParaRPr lang="en-US"/>
           </a:p>
@@ -2706,7 +2706,7 @@
           <a:p>
             <a:fld id="{A6220E79-6669-5F44-9D37-CE344312A2EE}" type="datetimeFigureOut">
               <a:rPr lang="en-US" smtClean="0"/>
-              <a:t>7/24/23</a:t>
+              <a:t>7/5/24</a:t>
             </a:fld>
             <a:endParaRPr lang="en-US"/>
           </a:p>
@@ -2947,7 +2947,7 @@
           <a:p>
             <a:fld id="{A6220E79-6669-5F44-9D37-CE344312A2EE}" type="datetimeFigureOut">
               <a:rPr lang="en-US" smtClean="0"/>
-              <a:t>7/24/23</a:t>
+              <a:t>7/5/24</a:t>
             </a:fld>
             <a:endParaRPr lang="en-US"/>
           </a:p>
@@ -3415,7 +3415,7 @@
           <a:p>
             <a:r>
               <a:rPr lang="en-US" dirty="0"/>
-              <a:t>Net Neuro 23</a:t>
+              <a:t>Net Neuro 24</a:t>
             </a:r>
           </a:p>
         </p:txBody>
@@ -4345,8 +4345,8 @@
         </p:nvSpPr>
         <p:spPr>
           <a:xfrm>
-            <a:off x="672662" y="1825624"/>
-            <a:ext cx="5423338" cy="4677027"/>
+            <a:off x="269328" y="1690688"/>
+            <a:ext cx="5743846" cy="4677027"/>
           </a:xfrm>
         </p:spPr>
         <p:txBody>
@@ -4382,7 +4382,7 @@
           </a:p>
           <a:p>
             <a:r>
-              <a:rPr lang="en-US" dirty="0"/>
+              <a:rPr lang="en-US" b="1" dirty="0"/>
               <a:t>Remote back-up and storage – but consider sensitive data and code</a:t>
             </a:r>
           </a:p>
@@ -4423,8 +4423,8 @@
         </p:blipFill>
         <p:spPr bwMode="auto">
           <a:xfrm>
-            <a:off x="6096000" y="1417090"/>
-            <a:ext cx="5983014" cy="5085562"/>
+            <a:off x="6368184" y="1555751"/>
+            <a:ext cx="5661134" cy="4811964"/>
           </a:xfrm>
           <a:prstGeom prst="rect">
             <a:avLst/>
@@ -7307,7 +7307,7 @@
             </a:pPr>
             <a:r>
               <a:rPr lang="en-US" i="1" dirty="0"/>
-              <a:t>Jot down a few notes about your collaboration to return to later on</a:t>
+              <a:t>Think about your collaboration to return to later on</a:t>
             </a:r>
           </a:p>
         </p:txBody>
@@ -9568,7 +9568,7 @@
         </p:blipFill>
         <p:spPr>
           <a:xfrm>
-            <a:off x="7760043" y="713981"/>
+            <a:off x="7461869" y="578350"/>
             <a:ext cx="3593757" cy="5659918"/>
           </a:xfrm>
           <a:prstGeom prst="rect">

</xml_diff>